<commit_message>
Finalizing the Word-reporting section
</commit_message>
<xml_diff>
--- a/temp/my powerpoint export.pptx
+++ b/temp/my powerpoint export.pptx
@@ -12,7 +12,6 @@
     <p:sldId id="260" r:id="rId12"/>
     <p:sldId id="261" r:id="rId13"/>
     <p:sldId id="262" r:id="rId14"/>
-    <p:sldId id="263" r:id="rId15"/>
   </p:sldIdLst>
   <p:sldSz cx="9144000" cy="6858000" type="screen4x3"/>
   <p:notesSz cx="6858000" cy="9144000"/>
@@ -115,828 +114,6 @@
     </a:lvl9pPr>
   </p:defaultTextStyle>
 </p:presentation>
-</file>
-
-<file path=ppt/charts/chart147045e43ef.xml><?xml version="1.0" encoding="utf-8"?>
-<c:chartSpace xmlns:c="http://schemas.openxmlformats.org/drawingml/2006/chart" xmlns:a="http://schemas.openxmlformats.org/drawingml/2006/main" xmlns:r="http://schemas.openxmlformats.org/officeDocument/2006/relationships">
-  <c:date1904 val="0"/>
-  <c:lang val="fr-FR"/>
-  <c:roundedCorners val="0"/>
-  <mc:AlternateContent xmlns:mc="http://schemas.openxmlformats.org/markup-compatibility/2006">
-    <mc:Choice xmlns:c14="http://schemas.microsoft.com/office/drawing/2007/8/2/chart" Requires="c14">
-      <c14:style val="118"/>
-    </mc:Choice>
-    <mc:Fallback>
-      <c:style val="18"/>
-    </mc:Fallback>
-  </mc:AlternateContent>
-  <c:chart>
-    <c:autoTitleDeleted val="1"/>
-    <c:plotArea xmlns:c="http://schemas.openxmlformats.org/drawingml/2006/chart" xmlns:a="http://schemas.openxmlformats.org/drawingml/2006/main" xmlns:r="http://schemas.openxmlformats.org/officeDocument/2006/relationships">
-      <c:layout/>
-      <c:barChart>
-        <c:barDir val="col"/>
-        <c:grouping val="clustered"/>
-        <c:varyColors val="0"/>
-        <c:ser>
-          <c:idx val="0"/>
-          <c:order val="0"/>
-          <c:tx>
-            <c:strRef>
-              <c:f>sheet1!$B$1</c:f>
-              <c:strCache>
-                <c:ptCount val="1"/>
-                <c:pt idx="0">
-                  <c:v>Bitter</c:v>
-                </c:pt>
-              </c:strCache>
-            </c:strRef>
-          </c:tx>
-          <c:spPr>
-            <a:solidFill>
-              <a:srgbClr val="4477AA">
-                <a:alpha val="100000"/>
-              </a:srgbClr>
-            </a:solidFill>
-            <a:ln w="25400">
-              <a:solidFill>
-                <a:srgbClr val="4477AA">
-                  <a:alpha val="100000"/>
-                </a:srgbClr>
-              </a:solidFill>
-            </a:ln>
-            <a:effectLst/>
-          </c:spPr>
-          <c:invertIfNegative val="0"/>
-          <c:dLbls>
-            <c:dLblPos val="ctr"/>
-            <c:numFmt formatCode="General" sourceLinked="0"/>
-            <c:separator val=", "/>
-            <c:showBubbleSize val="0"/>
-            <c:showCatName val="0"/>
-            <c:showLegendKey val="0"/>
-            <c:showPercent val="0"/>
-            <c:showSerName val="0"/>
-            <c:showVal val="0"/>
-            <c:txPr>
-              <a:bodyPr/>
-              <a:lstStyle/>
-              <a:p>
-                <a:pPr>
-                  <a:defRPr cap="none" i="0" b="0" u="none">
-                    <a:solidFill>
-                      <a:srgbClr val="000000">
-                        <a:alpha val="100000"/>
-                      </a:srgbClr>
-                    </a:solidFill>
-                    <a:latin typeface="Arial"/>
-                    <a:cs typeface="Arial"/>
-                    <a:ea typeface="Arial"/>
-                    <a:sym typeface="Arial"/>
-                  </a:defRPr>
-                </a:pPr>
-              </a:p>
-            </c:txPr>
-          </c:dLbls>
-          <c:cat>
-            <c:strRef>
-              <c:f>sheet1!$A$2:$A$12</c:f>
-              <c:strCache>
-                <c:ptCount val="11"/>
-                <c:pt idx="0">
-                  <c:v>P01</c:v>
-                </c:pt>
-                <c:pt idx="1">
-                  <c:v>P02</c:v>
-                </c:pt>
-                <c:pt idx="2">
-                  <c:v>P03</c:v>
-                </c:pt>
-                <c:pt idx="3">
-                  <c:v>P04</c:v>
-                </c:pt>
-                <c:pt idx="4">
-                  <c:v>P05</c:v>
-                </c:pt>
-                <c:pt idx="5">
-                  <c:v>P06</c:v>
-                </c:pt>
-                <c:pt idx="6">
-                  <c:v>P07</c:v>
-                </c:pt>
-                <c:pt idx="7">
-                  <c:v>P08</c:v>
-                </c:pt>
-                <c:pt idx="8">
-                  <c:v>P09</c:v>
-                </c:pt>
-                <c:pt idx="9">
-                  <c:v>P10</c:v>
-                </c:pt>
-                <c:pt idx="10">
-                  <c:v>POpt</c:v>
-                </c:pt>
-              </c:strCache>
-            </c:strRef>
-          </c:cat>
-          <c:val>
-            <c:numRef>
-              <c:f>sheet1!$B$2:$B$12</c:f>
-              <c:numCache>
-                <c:ptCount val="11"/>
-                <c:pt idx="0">
-                  <c:v>8.000000</c:v>
-                </c:pt>
-                <c:pt idx="1">
-                  <c:v>4.933333</c:v>
-                </c:pt>
-                <c:pt idx="2">
-                  <c:v>7.800000</c:v>
-                </c:pt>
-                <c:pt idx="3">
-                  <c:v>4.266667</c:v>
-                </c:pt>
-                <c:pt idx="4">
-                  <c:v>6.733333</c:v>
-                </c:pt>
-                <c:pt idx="5">
-                  <c:v>6.533333</c:v>
-                </c:pt>
-                <c:pt idx="6">
-                  <c:v>5.000000</c:v>
-                </c:pt>
-                <c:pt idx="7">
-                  <c:v>11.066667</c:v>
-                </c:pt>
-                <c:pt idx="8">
-                  <c:v>9.266667</c:v>
-                </c:pt>
-                <c:pt idx="9">
-                  <c:v>9.666667</c:v>
-                </c:pt>
-                <c:pt idx="10">
-                  <c:v>15.866667</c:v>
-                </c:pt>
-              </c:numCache>
-            </c:numRef>
-          </c:val>
-        </c:ser>
-        <c:ser>
-          <c:idx val="1"/>
-          <c:order val="1"/>
-          <c:tx>
-            <c:strRef>
-              <c:f>sheet1!$C$1</c:f>
-              <c:strCache>
-                <c:ptCount val="1"/>
-                <c:pt idx="0">
-                  <c:v>Salty</c:v>
-                </c:pt>
-              </c:strCache>
-            </c:strRef>
-          </c:tx>
-          <c:spPr>
-            <a:solidFill>
-              <a:srgbClr val="117733">
-                <a:alpha val="100000"/>
-              </a:srgbClr>
-            </a:solidFill>
-            <a:ln w="25400">
-              <a:solidFill>
-                <a:srgbClr val="117733">
-                  <a:alpha val="100000"/>
-                </a:srgbClr>
-              </a:solidFill>
-            </a:ln>
-            <a:effectLst/>
-          </c:spPr>
-          <c:invertIfNegative val="0"/>
-          <c:dLbls>
-            <c:dLblPos val="ctr"/>
-            <c:numFmt formatCode="General" sourceLinked="0"/>
-            <c:separator val=", "/>
-            <c:showBubbleSize val="0"/>
-            <c:showCatName val="0"/>
-            <c:showLegendKey val="0"/>
-            <c:showPercent val="0"/>
-            <c:showSerName val="0"/>
-            <c:showVal val="0"/>
-            <c:txPr>
-              <a:bodyPr/>
-              <a:lstStyle/>
-              <a:p>
-                <a:pPr>
-                  <a:defRPr cap="none" i="0" b="0" u="none">
-                    <a:solidFill>
-                      <a:srgbClr val="000000">
-                        <a:alpha val="100000"/>
-                      </a:srgbClr>
-                    </a:solidFill>
-                    <a:latin typeface="Arial"/>
-                    <a:cs typeface="Arial"/>
-                    <a:ea typeface="Arial"/>
-                    <a:sym typeface="Arial"/>
-                  </a:defRPr>
-                </a:pPr>
-              </a:p>
-            </c:txPr>
-          </c:dLbls>
-          <c:cat>
-            <c:strRef>
-              <c:f>sheet1!$A$2:$A$12</c:f>
-              <c:strCache>
-                <c:ptCount val="11"/>
-                <c:pt idx="0">
-                  <c:v>P01</c:v>
-                </c:pt>
-                <c:pt idx="1">
-                  <c:v>P02</c:v>
-                </c:pt>
-                <c:pt idx="2">
-                  <c:v>P03</c:v>
-                </c:pt>
-                <c:pt idx="3">
-                  <c:v>P04</c:v>
-                </c:pt>
-                <c:pt idx="4">
-                  <c:v>P05</c:v>
-                </c:pt>
-                <c:pt idx="5">
-                  <c:v>P06</c:v>
-                </c:pt>
-                <c:pt idx="6">
-                  <c:v>P07</c:v>
-                </c:pt>
-                <c:pt idx="7">
-                  <c:v>P08</c:v>
-                </c:pt>
-                <c:pt idx="8">
-                  <c:v>P09</c:v>
-                </c:pt>
-                <c:pt idx="9">
-                  <c:v>P10</c:v>
-                </c:pt>
-                <c:pt idx="10">
-                  <c:v>POpt</c:v>
-                </c:pt>
-              </c:strCache>
-            </c:strRef>
-          </c:cat>
-          <c:val>
-            <c:numRef>
-              <c:f>sheet1!$C$2:$C$12</c:f>
-              <c:numCache>
-                <c:ptCount val="11"/>
-                <c:pt idx="0">
-                  <c:v>5.100000</c:v>
-                </c:pt>
-                <c:pt idx="1">
-                  <c:v>2.933333</c:v>
-                </c:pt>
-                <c:pt idx="2">
-                  <c:v>4.666667</c:v>
-                </c:pt>
-                <c:pt idx="3">
-                  <c:v>3.600000</c:v>
-                </c:pt>
-                <c:pt idx="4">
-                  <c:v>5.866667</c:v>
-                </c:pt>
-                <c:pt idx="5">
-                  <c:v>8.200000</c:v>
-                </c:pt>
-                <c:pt idx="6">
-                  <c:v>2.800000</c:v>
-                </c:pt>
-                <c:pt idx="7">
-                  <c:v>2.466667</c:v>
-                </c:pt>
-                <c:pt idx="8">
-                  <c:v>4.000000</c:v>
-                </c:pt>
-                <c:pt idx="9">
-                  <c:v>9.000000</c:v>
-                </c:pt>
-                <c:pt idx="10">
-                  <c:v>6.666667</c:v>
-                </c:pt>
-              </c:numCache>
-            </c:numRef>
-          </c:val>
-        </c:ser>
-        <c:ser>
-          <c:idx val="2"/>
-          <c:order val="2"/>
-          <c:tx>
-            <c:strRef>
-              <c:f>sheet1!$D$1</c:f>
-              <c:strCache>
-                <c:ptCount val="1"/>
-                <c:pt idx="0">
-                  <c:v>Sour</c:v>
-                </c:pt>
-              </c:strCache>
-            </c:strRef>
-          </c:tx>
-          <c:spPr>
-            <a:solidFill>
-              <a:srgbClr val="DDCC77">
-                <a:alpha val="100000"/>
-              </a:srgbClr>
-            </a:solidFill>
-            <a:ln w="25400">
-              <a:solidFill>
-                <a:srgbClr val="DDCC77">
-                  <a:alpha val="100000"/>
-                </a:srgbClr>
-              </a:solidFill>
-            </a:ln>
-            <a:effectLst/>
-          </c:spPr>
-          <c:invertIfNegative val="0"/>
-          <c:dLbls>
-            <c:dLblPos val="ctr"/>
-            <c:numFmt formatCode="General" sourceLinked="0"/>
-            <c:separator val=", "/>
-            <c:showBubbleSize val="0"/>
-            <c:showCatName val="0"/>
-            <c:showLegendKey val="0"/>
-            <c:showPercent val="0"/>
-            <c:showSerName val="0"/>
-            <c:showVal val="0"/>
-            <c:txPr>
-              <a:bodyPr/>
-              <a:lstStyle/>
-              <a:p>
-                <a:pPr>
-                  <a:defRPr cap="none" i="0" b="0" u="none">
-                    <a:solidFill>
-                      <a:srgbClr val="000000">
-                        <a:alpha val="100000"/>
-                      </a:srgbClr>
-                    </a:solidFill>
-                    <a:latin typeface="Arial"/>
-                    <a:cs typeface="Arial"/>
-                    <a:ea typeface="Arial"/>
-                    <a:sym typeface="Arial"/>
-                  </a:defRPr>
-                </a:pPr>
-              </a:p>
-            </c:txPr>
-          </c:dLbls>
-          <c:cat>
-            <c:strRef>
-              <c:f>sheet1!$A$2:$A$12</c:f>
-              <c:strCache>
-                <c:ptCount val="11"/>
-                <c:pt idx="0">
-                  <c:v>P01</c:v>
-                </c:pt>
-                <c:pt idx="1">
-                  <c:v>P02</c:v>
-                </c:pt>
-                <c:pt idx="2">
-                  <c:v>P03</c:v>
-                </c:pt>
-                <c:pt idx="3">
-                  <c:v>P04</c:v>
-                </c:pt>
-                <c:pt idx="4">
-                  <c:v>P05</c:v>
-                </c:pt>
-                <c:pt idx="5">
-                  <c:v>P06</c:v>
-                </c:pt>
-                <c:pt idx="6">
-                  <c:v>P07</c:v>
-                </c:pt>
-                <c:pt idx="7">
-                  <c:v>P08</c:v>
-                </c:pt>
-                <c:pt idx="8">
-                  <c:v>P09</c:v>
-                </c:pt>
-                <c:pt idx="9">
-                  <c:v>P10</c:v>
-                </c:pt>
-                <c:pt idx="10">
-                  <c:v>POpt</c:v>
-                </c:pt>
-              </c:strCache>
-            </c:strRef>
-          </c:cat>
-          <c:val>
-            <c:numRef>
-              <c:f>sheet1!$D$2:$D$12</c:f>
-              <c:numCache>
-                <c:ptCount val="11"/>
-                <c:pt idx="0">
-                  <c:v>0.0000000</c:v>
-                </c:pt>
-                <c:pt idx="1">
-                  <c:v>0.0000000</c:v>
-                </c:pt>
-                <c:pt idx="2">
-                  <c:v>0.0000000</c:v>
-                </c:pt>
-                <c:pt idx="3">
-                  <c:v>0.0000000</c:v>
-                </c:pt>
-                <c:pt idx="4">
-                  <c:v>3.0000000</c:v>
-                </c:pt>
-                <c:pt idx="5">
-                  <c:v>4.0000000</c:v>
-                </c:pt>
-                <c:pt idx="6">
-                  <c:v>0.8666667</c:v>
-                </c:pt>
-                <c:pt idx="7">
-                  <c:v>0.9333333</c:v>
-                </c:pt>
-                <c:pt idx="8">
-                  <c:v>0.0000000</c:v>
-                </c:pt>
-                <c:pt idx="9">
-                  <c:v>5.0666667</c:v>
-                </c:pt>
-                <c:pt idx="10">
-                  <c:v>2.2000000</c:v>
-                </c:pt>
-              </c:numCache>
-            </c:numRef>
-          </c:val>
-        </c:ser>
-        <c:ser>
-          <c:idx val="3"/>
-          <c:order val="3"/>
-          <c:tx>
-            <c:strRef>
-              <c:f>sheet1!$E$1</c:f>
-              <c:strCache>
-                <c:ptCount val="1"/>
-                <c:pt idx="0">
-                  <c:v>Sweet</c:v>
-                </c:pt>
-              </c:strCache>
-            </c:strRef>
-          </c:tx>
-          <c:spPr>
-            <a:solidFill>
-              <a:srgbClr val="CC6677">
-                <a:alpha val="100000"/>
-              </a:srgbClr>
-            </a:solidFill>
-            <a:ln w="25400">
-              <a:solidFill>
-                <a:srgbClr val="CC6677">
-                  <a:alpha val="100000"/>
-                </a:srgbClr>
-              </a:solidFill>
-            </a:ln>
-            <a:effectLst/>
-          </c:spPr>
-          <c:invertIfNegative val="0"/>
-          <c:dLbls>
-            <c:dLblPos val="ctr"/>
-            <c:numFmt formatCode="General" sourceLinked="0"/>
-            <c:separator val=", "/>
-            <c:showBubbleSize val="0"/>
-            <c:showCatName val="0"/>
-            <c:showLegendKey val="0"/>
-            <c:showPercent val="0"/>
-            <c:showSerName val="0"/>
-            <c:showVal val="0"/>
-            <c:txPr>
-              <a:bodyPr/>
-              <a:lstStyle/>
-              <a:p>
-                <a:pPr>
-                  <a:defRPr cap="none" i="0" b="0" u="none">
-                    <a:solidFill>
-                      <a:srgbClr val="000000">
-                        <a:alpha val="100000"/>
-                      </a:srgbClr>
-                    </a:solidFill>
-                    <a:latin typeface="Arial"/>
-                    <a:cs typeface="Arial"/>
-                    <a:ea typeface="Arial"/>
-                    <a:sym typeface="Arial"/>
-                  </a:defRPr>
-                </a:pPr>
-              </a:p>
-            </c:txPr>
-          </c:dLbls>
-          <c:cat>
-            <c:strRef>
-              <c:f>sheet1!$A$2:$A$12</c:f>
-              <c:strCache>
-                <c:ptCount val="11"/>
-                <c:pt idx="0">
-                  <c:v>P01</c:v>
-                </c:pt>
-                <c:pt idx="1">
-                  <c:v>P02</c:v>
-                </c:pt>
-                <c:pt idx="2">
-                  <c:v>P03</c:v>
-                </c:pt>
-                <c:pt idx="3">
-                  <c:v>P04</c:v>
-                </c:pt>
-                <c:pt idx="4">
-                  <c:v>P05</c:v>
-                </c:pt>
-                <c:pt idx="5">
-                  <c:v>P06</c:v>
-                </c:pt>
-                <c:pt idx="6">
-                  <c:v>P07</c:v>
-                </c:pt>
-                <c:pt idx="7">
-                  <c:v>P08</c:v>
-                </c:pt>
-                <c:pt idx="8">
-                  <c:v>P09</c:v>
-                </c:pt>
-                <c:pt idx="9">
-                  <c:v>P10</c:v>
-                </c:pt>
-                <c:pt idx="10">
-                  <c:v>POpt</c:v>
-                </c:pt>
-              </c:strCache>
-            </c:strRef>
-          </c:cat>
-          <c:val>
-            <c:numRef>
-              <c:f>sheet1!$E$2:$E$12</c:f>
-              <c:numCache>
-                <c:ptCount val="11"/>
-                <c:pt idx="0">
-                  <c:v>22.20000</c:v>
-                </c:pt>
-                <c:pt idx="1">
-                  <c:v>15.80000</c:v>
-                </c:pt>
-                <c:pt idx="2">
-                  <c:v>10.40000</c:v>
-                </c:pt>
-                <c:pt idx="3">
-                  <c:v>16.60000</c:v>
-                </c:pt>
-                <c:pt idx="4">
-                  <c:v>21.00000</c:v>
-                </c:pt>
-                <c:pt idx="5">
-                  <c:v>14.73333</c:v>
-                </c:pt>
-                <c:pt idx="6">
-                  <c:v>19.46667</c:v>
-                </c:pt>
-                <c:pt idx="7">
-                  <c:v>14.26667</c:v>
-                </c:pt>
-                <c:pt idx="8">
-                  <c:v>13.33333</c:v>
-                </c:pt>
-                <c:pt idx="9">
-                  <c:v>30.46667</c:v>
-                </c:pt>
-                <c:pt idx="10">
-                  <c:v>17.73333</c:v>
-                </c:pt>
-              </c:numCache>
-            </c:numRef>
-          </c:val>
-        </c:ser>
-        <c:dLbls>
-          <c:dLblPos val="ctr"/>
-          <c:numFmt formatCode="General" sourceLinked="0"/>
-          <c:separator val=", "/>
-          <c:showBubbleSize val="0"/>
-          <c:showCatName val="0"/>
-          <c:showLegendKey val="0"/>
-          <c:showPercent val="0"/>
-          <c:showSerName val="0"/>
-          <c:showVal val="0"/>
-        </c:dLbls>
-        <c:gapWidth val="150"/>
-        <c:overlap val="0"/>
-        <c:axId val="64451712"/>
-        <c:axId val="64453248"/>
-      </c:barChart>
-      <c:catAx>
-        <c:axId val="64451712"/>
-        <c:scaling>
-          <c:orientation val="minMax"/>
-        </c:scaling>
-        <c:delete val="0"/>
-        <c:axPos val="b"/>
-        <c:majorGridlines>
-          <c:spPr>
-            <a:ln algn="ctr" w="12700">
-              <a:solidFill>
-                <a:srgbClr val="999999">
-                  <a:alpha val="60000"/>
-                </a:srgbClr>
-              </a:solidFill>
-              <a:prstDash val="sysDash"/>
-            </a:ln>
-          </c:spPr>
-        </c:majorGridlines>
-        <c:title>
-          <c:tx>
-            <c:rich>
-              <a:bodyPr rot="0" vert="horz" anchor="ctr"/>
-              <a:lstStyle/>
-              <a:p>
-                <a:pPr>
-                  <a:defRPr/>
-                </a:pPr>
-                <a:r>
-                  <a:rPr cap="none" sz="1600" i="0" b="1" u="none">
-                    <a:solidFill>
-                      <a:srgbClr val="000000">
-                        <a:alpha val="100000"/>
-                      </a:srgbClr>
-                    </a:solidFill>
-                    <a:latin typeface="Arial"/>
-                    <a:cs typeface="Arial"/>
-                    <a:ea typeface="Arial"/>
-                    <a:sym typeface="Arial"/>
-                  </a:rPr>
-                  <a:t>Product</a:t>
-                </a:r>
-              </a:p>
-            </c:rich>
-          </c:tx>
-          <c:layout/>
-          <c:overlay val="0"/>
-        </c:title>
-        <c:majorTickMark val="cross"/>
-        <c:minorTickMark val="none"/>
-        <c:tickLblPos val="nextTo"/>
-        <c:txPr>
-          <a:bodyPr rot="0" vert="horz"/>
-          <a:lstStyle/>
-          <a:p>
-            <a:pPr>
-              <a:defRPr cap="none" sz="1000" i="0" b="0" u="none">
-                <a:solidFill>
-                  <a:srgbClr val="000000">
-                    <a:alpha val="100000"/>
-                  </a:srgbClr>
-                </a:solidFill>
-                <a:latin typeface="Arial"/>
-                <a:cs typeface="Arial"/>
-                <a:ea typeface="Arial"/>
-                <a:sym typeface="Arial"/>
-              </a:defRPr>
-            </a:pPr>
-          </a:p>
-        </c:txPr>
-        <c:spPr>
-          <a:ln algn="ctr" w="12700">
-            <a:solidFill>
-              <a:srgbClr val="999999">
-                <a:alpha val="60000"/>
-              </a:srgbClr>
-            </a:solidFill>
-            <a:prstDash val="solid"/>
-          </a:ln>
-        </c:spPr>
-        <c:numFmt formatCode="General" sourceLinked="0"/>
-        <c:crossAx val="64453248"/>
-        <c:crosses val="autoZero"/>
-      </c:catAx>
-      <c:valAx>
-        <c:axId val="64453248"/>
-        <c:scaling>
-          <c:orientation val="minMax"/>
-        </c:scaling>
-        <c:delete val="0"/>
-        <c:axPos val="l"/>
-        <c:majorGridlines>
-          <c:spPr>
-            <a:ln algn="ctr" w="12700">
-              <a:solidFill>
-                <a:srgbClr val="999999">
-                  <a:alpha val="60000"/>
-                </a:srgbClr>
-              </a:solidFill>
-              <a:prstDash val="sysDash"/>
-            </a:ln>
-          </c:spPr>
-        </c:majorGridlines>
-        <c:title>
-          <c:tx>
-            <c:rich>
-              <a:bodyPr rot="16200000" vert="horz" anchor="ctr"/>
-              <a:lstStyle/>
-              <a:p>
-                <a:pPr>
-                  <a:defRPr/>
-                </a:pPr>
-                <a:r>
-                  <a:rPr cap="none" sz="1600" i="0" b="1" u="none">
-                    <a:solidFill>
-                      <a:srgbClr val="000000">
-                        <a:alpha val="100000"/>
-                      </a:srgbClr>
-                    </a:solidFill>
-                    <a:latin typeface="Arial"/>
-                    <a:cs typeface="Arial"/>
-                    <a:ea typeface="Arial"/>
-                    <a:sym typeface="Arial"/>
-                  </a:rPr>
-                  <a:t>Value</a:t>
-                </a:r>
-              </a:p>
-            </c:rich>
-          </c:tx>
-          <c:layout/>
-          <c:overlay val="0"/>
-        </c:title>
-        <c:majorTickMark val="cross"/>
-        <c:minorTickMark val="none"/>
-        <c:tickLblPos val="nextTo"/>
-        <c:txPr>
-          <a:bodyPr rot="0" vert="horz"/>
-          <a:lstStyle/>
-          <a:p>
-            <a:pPr>
-              <a:defRPr cap="none" sz="1000" i="0" b="0" u="none">
-                <a:solidFill>
-                  <a:srgbClr val="000000">
-                    <a:alpha val="100000"/>
-                  </a:srgbClr>
-                </a:solidFill>
-                <a:latin typeface="Arial"/>
-                <a:cs typeface="Arial"/>
-                <a:ea typeface="Arial"/>
-                <a:sym typeface="Arial"/>
-              </a:defRPr>
-            </a:pPr>
-          </a:p>
-        </c:txPr>
-        <c:spPr>
-          <a:ln algn="ctr" w="12700">
-            <a:solidFill>
-              <a:srgbClr val="999999">
-                <a:alpha val="60000"/>
-              </a:srgbClr>
-            </a:solidFill>
-            <a:prstDash val="solid"/>
-          </a:ln>
-        </c:spPr>
-        <c:numFmt formatCode="General" sourceLinked="0"/>
-        <c:crossAx val="64451712"/>
-        <c:crosses val="autoZero"/>
-      </c:valAx>
-    </c:plotArea>
-    <c:legend>
-      <c:legendPos val="b"/>
-      <c:layout/>
-      <c:overlay val="0"/>
-      <c:txPr xmlns:c="http://schemas.openxmlformats.org/drawingml/2006/chart" xmlns:a="http://schemas.openxmlformats.org/drawingml/2006/main">
-        <a:bodyPr/>
-        <a:lstStyle/>
-        <a:p>
-          <a:pPr>
-            <a:defRPr cap="none" sz="1400" i="0" b="0" u="none">
-              <a:solidFill>
-                <a:srgbClr val="000000">
-                  <a:alpha val="100000"/>
-                </a:srgbClr>
-              </a:solidFill>
-              <a:latin typeface="Arial"/>
-              <a:cs typeface="Arial"/>
-              <a:ea typeface="Arial"/>
-              <a:sym typeface="Arial"/>
-            </a:defRPr>
-          </a:pPr>
-        </a:p>
-      </c:txPr>
-    </c:legend>
-    <c:plotVisOnly val="1"/>
-    <c:dispBlanksAs val="gap"/>
-    <c:showDLblsOverMax val="0"/>
-  </c:chart>
-  <c:txPr>
-    <a:bodyPr/>
-    <a:lstStyle/>
-    <a:p>
-      <a:pPr>
-        <a:defRPr sz="1800"/>
-      </a:pPr>
-      <a:endParaRPr lang="fr-FR"/>
-    </a:p>
-  </c:txPr>
-  <c:externalData r:id="rId1">
-    <c:autoUpdate val="0"/>
-  </c:externalData>
-</c:chartSpace>
 </file>
 
 <file path=ppt/slideLayouts/slideLayout1.xml><?xml version="1.0" encoding="utf-8"?>
@@ -12481,49 +11658,6 @@
 </p:sld>
 </file>
 
-<file path=ppt/slides/slide8.xml><?xml version="1.0" encoding="utf-8"?>
-<p:sld xmlns:a="http://schemas.openxmlformats.org/drawingml/2006/main" xmlns:r="http://schemas.openxmlformats.org/officeDocument/2006/relationships" xmlns:p="http://schemas.openxmlformats.org/presentationml/2006/main">
-  <p:cSld>
-    <p:spTree>
-      <p:nvGrpSpPr>
-        <p:cNvPr id="1" name=""/>
-        <p:cNvGrpSpPr/>
-        <p:nvPr/>
-      </p:nvGrpSpPr>
-      <p:grpSpPr>
-        <a:xfrm>
-          <a:off x="0" y="0"/>
-          <a:ext cx="0" cy="0"/>
-          <a:chOff x="0" y="0"/>
-          <a:chExt cx="0" cy="0"/>
-        </a:xfrm>
-      </p:grpSpPr>
-      <p:graphicFrame xmlns:a="http://schemas.openxmlformats.org/drawingml/2006/main" xmlns:r="http://schemas.openxmlformats.org/officeDocument/2006/relationships" xmlns:p="http://schemas.openxmlformats.org/presentationml/2006/main">
-        <p:nvGraphicFramePr>
-          <p:cNvPr id="2" name="Content Placeholder 2"/>
-          <p:cNvGraphicFramePr>
-            <a:graphicFrameLocks noGrp="true"/>
-          </p:cNvGraphicFramePr>
-          <p:nvPr/>
-        </p:nvGraphicFramePr>
-        <p:xfrm rot="0">
-          <a:off x="457200" y="1600200"/>
-          <a:ext cx="8229600" cy="4525963"/>
-        </p:xfrm>
-        <a:graphic>
-          <a:graphicData uri="http://schemas.openxmlformats.org/drawingml/2006/chart">
-            <c:chart xmlns:c="http://schemas.openxmlformats.org/drawingml/2006/chart" xmlns:r="http://schemas.openxmlformats.org/officeDocument/2006/relationships" r:id="rId2"/>
-          </a:graphicData>
-        </a:graphic>
-      </p:graphicFrame>
-    </p:spTree>
-  </p:cSld>
-  <p:clrMapOvr>
-    <a:masterClrMapping/>
-  </p:clrMapOvr>
-</p:sld>
-</file>
-
 <file path=ppt/tags/tag1.xml><?xml version="1.0" encoding="utf-8"?>
 <p:tagLst xmlns:a="http://schemas.openxmlformats.org/drawingml/2006/main" xmlns:r="http://schemas.openxmlformats.org/officeDocument/2006/relationships" xmlns:p="http://schemas.openxmlformats.org/presentationml/2006/main">
   <p:tag name="_AMO_UNIQUEIDENTIFIER" val="Empty"/>

</xml_diff>